<commit_message>
Update presentation with v2 pipeline improvements and fine-tuning slides
New slides:
- v2 Pipeline Improvements (DBCV selection, 3D sweep, full-dataset eval, precomputed NN)
- DBCV explainer (how it works, why needed, score interpretation)
- Fine-Tuning Results table (v2 pipeline with per-model DBCV sweep)
- Fine-Tuning Key Takeaways (tighter clusters, less noise, per-model tuning)

Updated:
- Summary slide: Cluster, Evaluate, Fine-Tune descriptions reflect v2 changes

Co-Authored-By: Claude Opus 4.6 <noreply@anthropic.com>
</commit_message>
<xml_diff>
--- a/Utterance_Clustering_Pipeline.pptx
+++ b/Utterance_Clustering_Pipeline.pptx
@@ -17,12 +17,16 @@
     <p:sldId id="262" r:id="rId8"/>
     <p:sldId id="263" r:id="rId9"/>
     <p:sldId id="264" r:id="rId10"/>
+    <p:sldId id="272" r:id="rId23"/>
+    <p:sldId id="273" r:id="rId24"/>
     <p:sldId id="265" r:id="rId11"/>
     <p:sldId id="266" r:id="rId12"/>
     <p:sldId id="267" r:id="rId13"/>
     <p:sldId id="268" r:id="rId14"/>
     <p:sldId id="269" r:id="rId15"/>
     <p:sldId id="270" r:id="rId16"/>
+    <p:sldId id="274" r:id="rId25"/>
+    <p:sldId id="275" r:id="rId26"/>
     <p:sldId id="271" r:id="rId17"/>
   </p:sldIdLst>
   <p:sldSz cx="9144000" cy="5143500" type="screen16x9"/>
@@ -5524,7 +5528,7 @@
                 <a:ea typeface="Calibri" pitchFamily="34" charset="-122"/>
                 <a:cs typeface="Calibri" pitchFamily="34" charset="-120"/>
               </a:rPr>
-              <a:t>HDBSCAN finds natural groups without specifying k; handles noise</a:t>
+              <a:t>HDBSCAN + DBCV-based parameter sweep; ≤30 cluster constraint</a:t>
             </a:r>
             <a:endParaRPr lang="en-US" sz="1300" dirty="0"/>
           </a:p>
@@ -5702,7 +5706,7 @@
                 <a:ea typeface="Calibri" pitchFamily="34" charset="-122"/>
                 <a:cs typeface="Calibri" pitchFamily="34" charset="-120"/>
               </a:rPr>
-              <a:t>ARI &amp; NMI measure quality vs ground-truth labels; score &gt; 0.8 = excellent</a:t>
+              <a:t>DBCV (internal) + ARI/NMI on full dataset via approximate_predict</a:t>
             </a:r>
             <a:endParaRPr lang="en-US" sz="1300" dirty="0"/>
           </a:p>
@@ -6058,7 +6062,7 @@
                 <a:ea typeface="Calibri" pitchFamily="34" charset="-122"/>
                 <a:cs typeface="Calibri" pitchFamily="34" charset="-120"/>
               </a:rPr>
-              <a:t>MNR Loss + in-batch negatives to adapt embeddings to your domain</a:t>
+              <a:t>MNR Loss + per-model DBCV sweep; fairer base vs fine-tuned comparison</a:t>
             </a:r>
             <a:endParaRPr lang="en-US" sz="1300" dirty="0"/>
           </a:p>
@@ -6141,6 +6145,2372 @@
               <a:t>Upload your dataset and we can run the full pipeline — embedding, fine-tuning, clustering, and visualization.</a:t>
             </a:r>
             <a:endParaRPr lang="en-US" sz="1400" dirty="0"/>
+          </a:p>
+        </p:txBody>
+      </p:sp>
+    </p:spTree>
+  </p:cSld>
+  <p:clrMapOvr>
+    <a:masterClrMapping/>
+  </p:clrMapOvr>
+</p:sld>
+</file>
+
+<file path=ppt/slides/slide17.xml><?xml version="1.0" encoding="utf-8"?>
+<p:sld xmlns:a="http://schemas.openxmlformats.org/drawingml/2006/main" xmlns:p="http://schemas.openxmlformats.org/presentationml/2006/main" xmlns:r="http://schemas.openxmlformats.org/officeDocument/2006/relationships">
+  <p:cSld>
+    <p:bg>
+      <p:bgPr>
+        <a:solidFill>
+          <a:srgbClr val="0F172A"/>
+        </a:solidFill>
+        <a:effectLst/>
+      </p:bgPr>
+    </p:bg>
+    <p:spTree>
+      <p:nvGrpSpPr>
+        <p:cNvPr id="1" name=""/>
+        <p:cNvGrpSpPr/>
+        <p:nvPr/>
+      </p:nvGrpSpPr>
+      <p:grpSpPr/>
+      <p:sp>
+        <p:nvSpPr>
+          <p:cNvPr id="2" name="Rectangle 1"/>
+          <p:cNvSpPr/>
+          <p:nvPr/>
+        </p:nvSpPr>
+        <p:spPr>
+          <a:xfrm>
+            <a:off x="0" y="0"/>
+            <a:ext cx="9144000" cy="54864"/>
+          </a:xfrm>
+          <a:prstGeom prst="rect">
+            <a:avLst/>
+          </a:prstGeom>
+          <a:solidFill>
+            <a:srgbClr val="7C3AED"/>
+          </a:solidFill>
+          <a:ln>
+            <a:noFill/>
+          </a:ln>
+        </p:spPr>
+        <p:style>
+          <a:lnRef idx="1">
+            <a:schemeClr val="accent1"/>
+          </a:lnRef>
+          <a:fillRef idx="3">
+            <a:schemeClr val="accent1"/>
+          </a:fillRef>
+          <a:effectRef idx="2">
+            <a:schemeClr val="accent1"/>
+          </a:effectRef>
+          <a:fontRef idx="minor">
+            <a:schemeClr val="lt1"/>
+          </a:fontRef>
+        </p:style>
+        <p:txBody>
+          <a:bodyPr rtlCol="0" anchor="ctr"/>
+          <a:lstStyle/>
+          <a:p>
+            <a:pPr algn="ctr"/>
+          </a:p>
+        </p:txBody>
+      </p:sp>
+      <p:sp>
+        <p:nvSpPr>
+          <p:cNvPr id="3" name="Rounded Rectangle 2"/>
+          <p:cNvSpPr/>
+          <p:nvPr/>
+        </p:nvSpPr>
+        <p:spPr>
+          <a:xfrm>
+            <a:off x="457200" y="182880"/>
+            <a:ext cx="640080" cy="457200"/>
+          </a:xfrm>
+          <a:prstGeom prst="roundRect">
+            <a:avLst/>
+          </a:prstGeom>
+          <a:solidFill>
+            <a:srgbClr val="7C3AED"/>
+          </a:solidFill>
+          <a:ln>
+            <a:noFill/>
+          </a:ln>
+        </p:spPr>
+        <p:style>
+          <a:lnRef idx="1">
+            <a:schemeClr val="accent1"/>
+          </a:lnRef>
+          <a:fillRef idx="3">
+            <a:schemeClr val="accent1"/>
+          </a:fillRef>
+          <a:effectRef idx="2">
+            <a:schemeClr val="accent1"/>
+          </a:effectRef>
+          <a:fontRef idx="minor">
+            <a:schemeClr val="lt1"/>
+          </a:fontRef>
+        </p:style>
+        <p:txBody>
+          <a:bodyPr rtlCol="0" anchor="ctr" wrap="square"/>
+          <a:lstStyle/>
+          <a:p>
+            <a:pPr algn="ctr"/>
+            <a:r>
+              <a:rPr sz="2000">
+                <a:solidFill>
+                  <a:srgbClr val="FFFFFF"/>
+                </a:solidFill>
+                <a:latin typeface="Arial Black"/>
+              </a:rPr>
+              <a:t>V2</a:t>
+            </a:r>
+          </a:p>
+        </p:txBody>
+      </p:sp>
+      <p:sp>
+        <p:nvSpPr>
+          <p:cNvPr id="4" name="TextBox 3"/>
+          <p:cNvSpPr txBox="1"/>
+          <p:nvPr/>
+        </p:nvSpPr>
+        <p:spPr>
+          <a:xfrm>
+            <a:off x="1280160" y="182880"/>
+            <a:ext cx="7315200" cy="457200"/>
+          </a:xfrm>
+          <a:prstGeom prst="rect">
+            <a:avLst/>
+          </a:prstGeom>
+          <a:noFill/>
+        </p:spPr>
+        <p:txBody>
+          <a:bodyPr wrap="square">
+            <a:spAutoFit/>
+          </a:bodyPr>
+          <a:lstStyle/>
+          <a:p>
+            <a:r>
+              <a:rPr sz="2800" b="0">
+                <a:solidFill>
+                  <a:srgbClr val="FFFFFF"/>
+                </a:solidFill>
+                <a:latin typeface="Arial Black"/>
+              </a:rPr>
+              <a:t>v2 Pipeline Improvements</a:t>
+            </a:r>
+          </a:p>
+        </p:txBody>
+      </p:sp>
+      <p:sp>
+        <p:nvSpPr>
+          <p:cNvPr id="5" name="TextBox 4"/>
+          <p:cNvSpPr txBox="1"/>
+          <p:nvPr/>
+        </p:nvSpPr>
+        <p:spPr>
+          <a:xfrm>
+            <a:off x="1280160" y="640080"/>
+            <a:ext cx="7315200" cy="320040"/>
+          </a:xfrm>
+          <a:prstGeom prst="rect">
+            <a:avLst/>
+          </a:prstGeom>
+          <a:noFill/>
+        </p:spPr>
+        <p:txBody>
+          <a:bodyPr wrap="square">
+            <a:spAutoFit/>
+          </a:bodyPr>
+          <a:lstStyle/>
+          <a:p>
+            <a:r>
+              <a:rPr sz="1300">
+                <a:solidFill>
+                  <a:srgbClr val="94A3B8"/>
+                </a:solidFill>
+                <a:latin typeface="Calibri"/>
+              </a:rPr>
+              <a:t>Key methodological and performance improvements over the baseline clustering pipeline</a:t>
+            </a:r>
+          </a:p>
+        </p:txBody>
+      </p:sp>
+      <p:sp>
+        <p:nvSpPr>
+          <p:cNvPr id="6" name="Rounded Rectangle 5"/>
+          <p:cNvSpPr/>
+          <p:nvPr/>
+        </p:nvSpPr>
+        <p:spPr>
+          <a:xfrm>
+            <a:off x="274320" y="1051560"/>
+            <a:ext cx="4023360" cy="1280160"/>
+          </a:xfrm>
+          <a:prstGeom prst="roundRect">
+            <a:avLst/>
+          </a:prstGeom>
+          <a:solidFill>
+            <a:srgbClr val="1E293B"/>
+          </a:solidFill>
+          <a:ln>
+            <a:noFill/>
+          </a:ln>
+        </p:spPr>
+        <p:style>
+          <a:lnRef idx="1">
+            <a:schemeClr val="accent1"/>
+          </a:lnRef>
+          <a:fillRef idx="3">
+            <a:schemeClr val="accent1"/>
+          </a:fillRef>
+          <a:effectRef idx="2">
+            <a:schemeClr val="accent1"/>
+          </a:effectRef>
+          <a:fontRef idx="minor">
+            <a:schemeClr val="lt1"/>
+          </a:fontRef>
+        </p:style>
+        <p:txBody>
+          <a:bodyPr rtlCol="0" anchor="ctr"/>
+          <a:lstStyle/>
+          <a:p>
+            <a:pPr algn="ctr"/>
+          </a:p>
+        </p:txBody>
+      </p:sp>
+      <p:sp>
+        <p:nvSpPr>
+          <p:cNvPr id="7" name="TextBox 6"/>
+          <p:cNvSpPr txBox="1"/>
+          <p:nvPr/>
+        </p:nvSpPr>
+        <p:spPr>
+          <a:xfrm>
+            <a:off x="365760" y="1120140"/>
+            <a:ext cx="3840480" cy="228600"/>
+          </a:xfrm>
+          <a:prstGeom prst="rect">
+            <a:avLst/>
+          </a:prstGeom>
+          <a:noFill/>
+        </p:spPr>
+        <p:txBody>
+          <a:bodyPr wrap="square">
+            <a:spAutoFit/>
+          </a:bodyPr>
+          <a:lstStyle/>
+          <a:p>
+            <a:r>
+              <a:rPr sz="1400" b="0">
+                <a:solidFill>
+                  <a:srgbClr val="7C3AED"/>
+                </a:solidFill>
+                <a:latin typeface="Arial Black"/>
+              </a:rPr>
+              <a:t>DBCV-Based Selection</a:t>
+            </a:r>
+          </a:p>
+        </p:txBody>
+      </p:sp>
+      <p:sp>
+        <p:nvSpPr>
+          <p:cNvPr id="8" name="TextBox 7"/>
+          <p:cNvSpPr txBox="1"/>
+          <p:nvPr/>
+        </p:nvSpPr>
+        <p:spPr>
+          <a:xfrm>
+            <a:off x="365760" y="1325880"/>
+            <a:ext cx="3840480" cy="937260"/>
+          </a:xfrm>
+          <a:prstGeom prst="rect">
+            <a:avLst/>
+          </a:prstGeom>
+          <a:noFill/>
+        </p:spPr>
+        <p:txBody>
+          <a:bodyPr wrap="square">
+            <a:spAutoFit/>
+          </a:bodyPr>
+          <a:lstStyle/>
+          <a:p>
+            <a:r>
+              <a:rPr sz="1100">
+                <a:solidFill>
+                  <a:srgbClr val="CADCFC"/>
+                </a:solidFill>
+                <a:latin typeface="Calibri"/>
+              </a:rPr>
+              <a:t>Replaced ARI (circular, uses labels) with DBCV — an internal validity metric that evaluates clustering quality from data geometry alone, with no label leakage.</a:t>
+            </a:r>
+          </a:p>
+        </p:txBody>
+      </p:sp>
+      <p:sp>
+        <p:nvSpPr>
+          <p:cNvPr id="9" name="Rounded Rectangle 8"/>
+          <p:cNvSpPr/>
+          <p:nvPr/>
+        </p:nvSpPr>
+        <p:spPr>
+          <a:xfrm>
+            <a:off x="4480560" y="1051560"/>
+            <a:ext cx="4023360" cy="1280160"/>
+          </a:xfrm>
+          <a:prstGeom prst="roundRect">
+            <a:avLst/>
+          </a:prstGeom>
+          <a:solidFill>
+            <a:srgbClr val="1E293B"/>
+          </a:solidFill>
+          <a:ln>
+            <a:noFill/>
+          </a:ln>
+        </p:spPr>
+        <p:style>
+          <a:lnRef idx="1">
+            <a:schemeClr val="accent1"/>
+          </a:lnRef>
+          <a:fillRef idx="3">
+            <a:schemeClr val="accent1"/>
+          </a:fillRef>
+          <a:effectRef idx="2">
+            <a:schemeClr val="accent1"/>
+          </a:effectRef>
+          <a:fontRef idx="minor">
+            <a:schemeClr val="lt1"/>
+          </a:fontRef>
+        </p:style>
+        <p:txBody>
+          <a:bodyPr rtlCol="0" anchor="ctr"/>
+          <a:lstStyle/>
+          <a:p>
+            <a:pPr algn="ctr"/>
+          </a:p>
+        </p:txBody>
+      </p:sp>
+      <p:sp>
+        <p:nvSpPr>
+          <p:cNvPr id="10" name="TextBox 9"/>
+          <p:cNvSpPr txBox="1"/>
+          <p:nvPr/>
+        </p:nvSpPr>
+        <p:spPr>
+          <a:xfrm>
+            <a:off x="4572000" y="1120140"/>
+            <a:ext cx="3840480" cy="228600"/>
+          </a:xfrm>
+          <a:prstGeom prst="rect">
+            <a:avLst/>
+          </a:prstGeom>
+          <a:noFill/>
+        </p:spPr>
+        <p:txBody>
+          <a:bodyPr wrap="square">
+            <a:spAutoFit/>
+          </a:bodyPr>
+          <a:lstStyle/>
+          <a:p>
+            <a:r>
+              <a:rPr sz="1400" b="0">
+                <a:solidFill>
+                  <a:srgbClr val="14B8A6"/>
+                </a:solidFill>
+                <a:latin typeface="Arial Black"/>
+              </a:rPr>
+              <a:t>3D Parameter Sweep</a:t>
+            </a:r>
+          </a:p>
+        </p:txBody>
+      </p:sp>
+      <p:sp>
+        <p:nvSpPr>
+          <p:cNvPr id="11" name="TextBox 10"/>
+          <p:cNvSpPr txBox="1"/>
+          <p:nvPr/>
+        </p:nvSpPr>
+        <p:spPr>
+          <a:xfrm>
+            <a:off x="4572000" y="1325880"/>
+            <a:ext cx="3840480" cy="937260"/>
+          </a:xfrm>
+          <a:prstGeom prst="rect">
+            <a:avLst/>
+          </a:prstGeom>
+          <a:noFill/>
+        </p:spPr>
+        <p:txBody>
+          <a:bodyPr wrap="square">
+            <a:spAutoFit/>
+          </a:bodyPr>
+          <a:lstStyle/>
+          <a:p>
+            <a:r>
+              <a:rPr sz="1100">
+                <a:solidFill>
+                  <a:srgbClr val="CADCFC"/>
+                </a:solidFill>
+                <a:latin typeface="Calibri"/>
+              </a:rPr>
+              <a:t>Expanded from 5 configs (min_cluster_size only) to 64 configs (min_cluster_size x min_samples x epsilon). Constrained to &lt;= 30 clusters.</a:t>
+            </a:r>
+          </a:p>
+        </p:txBody>
+      </p:sp>
+      <p:sp>
+        <p:nvSpPr>
+          <p:cNvPr id="12" name="Rounded Rectangle 11"/>
+          <p:cNvSpPr/>
+          <p:nvPr/>
+        </p:nvSpPr>
+        <p:spPr>
+          <a:xfrm>
+            <a:off x="274320" y="2514600"/>
+            <a:ext cx="4023360" cy="1280160"/>
+          </a:xfrm>
+          <a:prstGeom prst="roundRect">
+            <a:avLst/>
+          </a:prstGeom>
+          <a:solidFill>
+            <a:srgbClr val="1E293B"/>
+          </a:solidFill>
+          <a:ln>
+            <a:noFill/>
+          </a:ln>
+        </p:spPr>
+        <p:style>
+          <a:lnRef idx="1">
+            <a:schemeClr val="accent1"/>
+          </a:lnRef>
+          <a:fillRef idx="3">
+            <a:schemeClr val="accent1"/>
+          </a:fillRef>
+          <a:effectRef idx="2">
+            <a:schemeClr val="accent1"/>
+          </a:effectRef>
+          <a:fontRef idx="minor">
+            <a:schemeClr val="lt1"/>
+          </a:fontRef>
+        </p:style>
+        <p:txBody>
+          <a:bodyPr rtlCol="0" anchor="ctr"/>
+          <a:lstStyle/>
+          <a:p>
+            <a:pPr algn="ctr"/>
+          </a:p>
+        </p:txBody>
+      </p:sp>
+      <p:sp>
+        <p:nvSpPr>
+          <p:cNvPr id="13" name="TextBox 12"/>
+          <p:cNvSpPr txBox="1"/>
+          <p:nvPr/>
+        </p:nvSpPr>
+        <p:spPr>
+          <a:xfrm>
+            <a:off x="365760" y="2583180"/>
+            <a:ext cx="3840480" cy="228600"/>
+          </a:xfrm>
+          <a:prstGeom prst="rect">
+            <a:avLst/>
+          </a:prstGeom>
+          <a:noFill/>
+        </p:spPr>
+        <p:txBody>
+          <a:bodyPr wrap="square">
+            <a:spAutoFit/>
+          </a:bodyPr>
+          <a:lstStyle/>
+          <a:p>
+            <a:r>
+              <a:rPr sz="1400" b="0">
+                <a:solidFill>
+                  <a:srgbClr val="EC4899"/>
+                </a:solidFill>
+                <a:latin typeface="Arial Black"/>
+              </a:rPr>
+              <a:t>Full-Dataset Evaluation</a:t>
+            </a:r>
+          </a:p>
+        </p:txBody>
+      </p:sp>
+      <p:sp>
+        <p:nvSpPr>
+          <p:cNvPr id="14" name="TextBox 13"/>
+          <p:cNvSpPr txBox="1"/>
+          <p:nvPr/>
+        </p:nvSpPr>
+        <p:spPr>
+          <a:xfrm>
+            <a:off x="365760" y="2788920"/>
+            <a:ext cx="3840480" cy="937260"/>
+          </a:xfrm>
+          <a:prstGeom prst="rect">
+            <a:avLst/>
+          </a:prstGeom>
+          <a:noFill/>
+        </p:spPr>
+        <p:txBody>
+          <a:bodyPr wrap="square">
+            <a:spAutoFit/>
+          </a:bodyPr>
+          <a:lstStyle/>
+          <a:p>
+            <a:r>
+              <a:rPr sz="1100">
+                <a:solidFill>
+                  <a:srgbClr val="CADCFC"/>
+                </a:solidFill>
+                <a:latin typeface="Calibri"/>
+              </a:rPr>
+              <a:t>Noise points assigned via approximate_predict before scoring. Reports both excl-noise and full-dataset ARI/NMI for honest comparison.</a:t>
+            </a:r>
+          </a:p>
+        </p:txBody>
+      </p:sp>
+      <p:sp>
+        <p:nvSpPr>
+          <p:cNvPr id="15" name="Rounded Rectangle 14"/>
+          <p:cNvSpPr/>
+          <p:nvPr/>
+        </p:nvSpPr>
+        <p:spPr>
+          <a:xfrm>
+            <a:off x="4480560" y="2514600"/>
+            <a:ext cx="4023360" cy="1280160"/>
+          </a:xfrm>
+          <a:prstGeom prst="roundRect">
+            <a:avLst/>
+          </a:prstGeom>
+          <a:solidFill>
+            <a:srgbClr val="1E293B"/>
+          </a:solidFill>
+          <a:ln>
+            <a:noFill/>
+          </a:ln>
+        </p:spPr>
+        <p:style>
+          <a:lnRef idx="1">
+            <a:schemeClr val="accent1"/>
+          </a:lnRef>
+          <a:fillRef idx="3">
+            <a:schemeClr val="accent1"/>
+          </a:fillRef>
+          <a:effectRef idx="2">
+            <a:schemeClr val="accent1"/>
+          </a:effectRef>
+          <a:fontRef idx="minor">
+            <a:schemeClr val="lt1"/>
+          </a:fontRef>
+        </p:style>
+        <p:txBody>
+          <a:bodyPr rtlCol="0" anchor="ctr"/>
+          <a:lstStyle/>
+          <a:p>
+            <a:pPr algn="ctr"/>
+          </a:p>
+        </p:txBody>
+      </p:sp>
+      <p:sp>
+        <p:nvSpPr>
+          <p:cNvPr id="16" name="TextBox 15"/>
+          <p:cNvSpPr txBox="1"/>
+          <p:nvPr/>
+        </p:nvSpPr>
+        <p:spPr>
+          <a:xfrm>
+            <a:off x="4572000" y="2583180"/>
+            <a:ext cx="3840480" cy="228600"/>
+          </a:xfrm>
+          <a:prstGeom prst="rect">
+            <a:avLst/>
+          </a:prstGeom>
+          <a:noFill/>
+        </p:spPr>
+        <p:txBody>
+          <a:bodyPr wrap="square">
+            <a:spAutoFit/>
+          </a:bodyPr>
+          <a:lstStyle/>
+          <a:p>
+            <a:r>
+              <a:rPr sz="1400" b="0">
+                <a:solidFill>
+                  <a:srgbClr val="22C55E"/>
+                </a:solidFill>
+                <a:latin typeface="Arial Black"/>
+              </a:rPr>
+              <a:t>Precomputed NN Graph</a:t>
+            </a:r>
+          </a:p>
+        </p:txBody>
+      </p:sp>
+      <p:sp>
+        <p:nvSpPr>
+          <p:cNvPr id="17" name="TextBox 16"/>
+          <p:cNvSpPr txBox="1"/>
+          <p:nvPr/>
+        </p:nvSpPr>
+        <p:spPr>
+          <a:xfrm>
+            <a:off x="4572000" y="2788920"/>
+            <a:ext cx="3840480" cy="937260"/>
+          </a:xfrm>
+          <a:prstGeom prst="rect">
+            <a:avLst/>
+          </a:prstGeom>
+          <a:noFill/>
+        </p:spPr>
+        <p:txBody>
+          <a:bodyPr wrap="square">
+            <a:spAutoFit/>
+          </a:bodyPr>
+          <a:lstStyle/>
+          <a:p>
+            <a:r>
+              <a:rPr sz="1100">
+                <a:solidFill>
+                  <a:srgbClr val="CADCFC"/>
+                </a:solidFill>
+                <a:latin typeface="Calibri"/>
+              </a:rPr>
+              <a:t>Nearest-neighbor graph computed once and shared across both UMAP projections (15d clustering + 2d visualization), halving UMAP time.</a:t>
+            </a:r>
+          </a:p>
+        </p:txBody>
+      </p:sp>
+      <p:sp>
+        <p:nvSpPr>
+          <p:cNvPr id="18" name="TextBox 17"/>
+          <p:cNvSpPr txBox="1"/>
+          <p:nvPr/>
+        </p:nvSpPr>
+        <p:spPr>
+          <a:xfrm>
+            <a:off x="457200" y="4572000"/>
+            <a:ext cx="8229600" cy="320040"/>
+          </a:xfrm>
+          <a:prstGeom prst="rect">
+            <a:avLst/>
+          </a:prstGeom>
+          <a:noFill/>
+        </p:spPr>
+        <p:txBody>
+          <a:bodyPr wrap="square">
+            <a:spAutoFit/>
+          </a:bodyPr>
+          <a:lstStyle/>
+          <a:p>
+            <a:r>
+              <a:rPr sz="1100">
+                <a:solidFill>
+                  <a:srgbClr val="94A3B8"/>
+                </a:solidFill>
+                <a:latin typeface="Calibri"/>
+              </a:rPr>
+              <a:t>Also: cosine distance for centroid sampling | async LLM labeling | global random seeds | reusable scatter helper</a:t>
+            </a:r>
+          </a:p>
+        </p:txBody>
+      </p:sp>
+    </p:spTree>
+  </p:cSld>
+  <p:clrMapOvr>
+    <a:masterClrMapping/>
+  </p:clrMapOvr>
+</p:sld>
+</file>
+
+<file path=ppt/slides/slide18.xml><?xml version="1.0" encoding="utf-8"?>
+<p:sld xmlns:a="http://schemas.openxmlformats.org/drawingml/2006/main" xmlns:p="http://schemas.openxmlformats.org/presentationml/2006/main" xmlns:r="http://schemas.openxmlformats.org/officeDocument/2006/relationships">
+  <p:cSld>
+    <p:bg>
+      <p:bgPr>
+        <a:solidFill>
+          <a:srgbClr val="0F172A"/>
+        </a:solidFill>
+        <a:effectLst/>
+      </p:bgPr>
+    </p:bg>
+    <p:spTree>
+      <p:nvGrpSpPr>
+        <p:cNvPr id="1" name=""/>
+        <p:cNvGrpSpPr/>
+        <p:nvPr/>
+      </p:nvGrpSpPr>
+      <p:grpSpPr/>
+      <p:sp>
+        <p:nvSpPr>
+          <p:cNvPr id="2" name="Rectangle 1"/>
+          <p:cNvSpPr/>
+          <p:nvPr/>
+        </p:nvSpPr>
+        <p:spPr>
+          <a:xfrm>
+            <a:off x="0" y="0"/>
+            <a:ext cx="9144000" cy="54864"/>
+          </a:xfrm>
+          <a:prstGeom prst="rect">
+            <a:avLst/>
+          </a:prstGeom>
+          <a:solidFill>
+            <a:srgbClr val="7C3AED"/>
+          </a:solidFill>
+          <a:ln>
+            <a:noFill/>
+          </a:ln>
+        </p:spPr>
+        <p:style>
+          <a:lnRef idx="1">
+            <a:schemeClr val="accent1"/>
+          </a:lnRef>
+          <a:fillRef idx="3">
+            <a:schemeClr val="accent1"/>
+          </a:fillRef>
+          <a:effectRef idx="2">
+            <a:schemeClr val="accent1"/>
+          </a:effectRef>
+          <a:fontRef idx="minor">
+            <a:schemeClr val="lt1"/>
+          </a:fontRef>
+        </p:style>
+        <p:txBody>
+          <a:bodyPr rtlCol="0" anchor="ctr"/>
+          <a:lstStyle/>
+          <a:p>
+            <a:pPr algn="ctr"/>
+          </a:p>
+        </p:txBody>
+      </p:sp>
+      <p:sp>
+        <p:nvSpPr>
+          <p:cNvPr id="3" name="TextBox 2"/>
+          <p:cNvSpPr txBox="1"/>
+          <p:nvPr/>
+        </p:nvSpPr>
+        <p:spPr>
+          <a:xfrm>
+            <a:off x="457200" y="182880"/>
+            <a:ext cx="8229600" cy="457200"/>
+          </a:xfrm>
+          <a:prstGeom prst="rect">
+            <a:avLst/>
+          </a:prstGeom>
+          <a:noFill/>
+        </p:spPr>
+        <p:txBody>
+          <a:bodyPr wrap="square">
+            <a:spAutoFit/>
+          </a:bodyPr>
+          <a:lstStyle/>
+          <a:p>
+            <a:r>
+              <a:rPr sz="2800" b="0">
+                <a:solidFill>
+                  <a:srgbClr val="FFFFFF"/>
+                </a:solidFill>
+                <a:latin typeface="Arial Black"/>
+              </a:rPr>
+              <a:t>DBCV: Density-Based Clustering Validation</a:t>
+            </a:r>
+          </a:p>
+        </p:txBody>
+      </p:sp>
+      <p:sp>
+        <p:nvSpPr>
+          <p:cNvPr id="4" name="TextBox 3"/>
+          <p:cNvSpPr txBox="1"/>
+          <p:nvPr/>
+        </p:nvSpPr>
+        <p:spPr>
+          <a:xfrm>
+            <a:off x="457200" y="640080"/>
+            <a:ext cx="8229600" cy="320040"/>
+          </a:xfrm>
+          <a:prstGeom prst="rect">
+            <a:avLst/>
+          </a:prstGeom>
+          <a:noFill/>
+        </p:spPr>
+        <p:txBody>
+          <a:bodyPr wrap="square">
+            <a:spAutoFit/>
+          </a:bodyPr>
+          <a:lstStyle/>
+          <a:p>
+            <a:r>
+              <a:rPr sz="1300">
+                <a:solidFill>
+                  <a:srgbClr val="94A3B8"/>
+                </a:solidFill>
+                <a:latin typeface="Calibri"/>
+              </a:rPr>
+              <a:t>An internal validity metric designed for density-based clustering (Moulavi et al., 2014)</a:t>
+            </a:r>
+          </a:p>
+        </p:txBody>
+      </p:sp>
+      <p:sp>
+        <p:nvSpPr>
+          <p:cNvPr id="5" name="Rounded Rectangle 4"/>
+          <p:cNvSpPr/>
+          <p:nvPr/>
+        </p:nvSpPr>
+        <p:spPr>
+          <a:xfrm>
+            <a:off x="274320" y="1005840"/>
+            <a:ext cx="4206240" cy="2651760"/>
+          </a:xfrm>
+          <a:prstGeom prst="roundRect">
+            <a:avLst/>
+          </a:prstGeom>
+          <a:solidFill>
+            <a:srgbClr val="1E293B"/>
+          </a:solidFill>
+          <a:ln>
+            <a:noFill/>
+          </a:ln>
+        </p:spPr>
+        <p:style>
+          <a:lnRef idx="1">
+            <a:schemeClr val="accent1"/>
+          </a:lnRef>
+          <a:fillRef idx="3">
+            <a:schemeClr val="accent1"/>
+          </a:fillRef>
+          <a:effectRef idx="2">
+            <a:schemeClr val="accent1"/>
+          </a:effectRef>
+          <a:fontRef idx="minor">
+            <a:schemeClr val="lt1"/>
+          </a:fontRef>
+        </p:style>
+        <p:txBody>
+          <a:bodyPr rtlCol="0" anchor="ctr"/>
+          <a:lstStyle/>
+          <a:p>
+            <a:pPr algn="ctr"/>
+          </a:p>
+        </p:txBody>
+      </p:sp>
+      <p:sp>
+        <p:nvSpPr>
+          <p:cNvPr id="6" name="TextBox 5"/>
+          <p:cNvSpPr txBox="1"/>
+          <p:nvPr/>
+        </p:nvSpPr>
+        <p:spPr>
+          <a:xfrm>
+            <a:off x="365760" y="1074420"/>
+            <a:ext cx="4023360" cy="228600"/>
+          </a:xfrm>
+          <a:prstGeom prst="rect">
+            <a:avLst/>
+          </a:prstGeom>
+          <a:noFill/>
+        </p:spPr>
+        <p:txBody>
+          <a:bodyPr wrap="square">
+            <a:spAutoFit/>
+          </a:bodyPr>
+          <a:lstStyle/>
+          <a:p>
+            <a:r>
+              <a:rPr sz="1400" b="0">
+                <a:solidFill>
+                  <a:srgbClr val="7C3AED"/>
+                </a:solidFill>
+                <a:latin typeface="Arial Black"/>
+              </a:rPr>
+              <a:t>How DBCV Works</a:t>
+            </a:r>
+          </a:p>
+        </p:txBody>
+      </p:sp>
+      <p:sp>
+        <p:nvSpPr>
+          <p:cNvPr id="7" name="TextBox 6"/>
+          <p:cNvSpPr txBox="1"/>
+          <p:nvPr/>
+        </p:nvSpPr>
+        <p:spPr>
+          <a:xfrm>
+            <a:off x="365760" y="1280160"/>
+            <a:ext cx="4023360" cy="2308860"/>
+          </a:xfrm>
+          <a:prstGeom prst="rect">
+            <a:avLst/>
+          </a:prstGeom>
+          <a:noFill/>
+        </p:spPr>
+        <p:txBody>
+          <a:bodyPr wrap="square">
+            <a:spAutoFit/>
+          </a:bodyPr>
+          <a:lstStyle/>
+          <a:p>
+            <a:r>
+              <a:rPr sz="1100">
+                <a:solidFill>
+                  <a:srgbClr val="CADCFC"/>
+                </a:solidFill>
+                <a:latin typeface="Calibri"/>
+              </a:rPr>
+              <a:t>1. Build a minimum spanning tree within each cluster using mutual reachability distance (density-aware).
+2. Measure intra-cluster density (how tight) vs inter-cluster density (how separated).
+3. Per-cluster score: (separation - compactness) / max(both)
+4. Global score: density-weighted average across all clusters.</a:t>
+            </a:r>
+          </a:p>
+        </p:txBody>
+      </p:sp>
+      <p:sp>
+        <p:nvSpPr>
+          <p:cNvPr id="8" name="Rounded Rectangle 7"/>
+          <p:cNvSpPr/>
+          <p:nvPr/>
+        </p:nvSpPr>
+        <p:spPr>
+          <a:xfrm>
+            <a:off x="4663440" y="1005840"/>
+            <a:ext cx="4206240" cy="2651760"/>
+          </a:xfrm>
+          <a:prstGeom prst="roundRect">
+            <a:avLst/>
+          </a:prstGeom>
+          <a:solidFill>
+            <a:srgbClr val="1E293B"/>
+          </a:solidFill>
+          <a:ln>
+            <a:noFill/>
+          </a:ln>
+        </p:spPr>
+        <p:style>
+          <a:lnRef idx="1">
+            <a:schemeClr val="accent1"/>
+          </a:lnRef>
+          <a:fillRef idx="3">
+            <a:schemeClr val="accent1"/>
+          </a:fillRef>
+          <a:effectRef idx="2">
+            <a:schemeClr val="accent1"/>
+          </a:effectRef>
+          <a:fontRef idx="minor">
+            <a:schemeClr val="lt1"/>
+          </a:fontRef>
+        </p:style>
+        <p:txBody>
+          <a:bodyPr rtlCol="0" anchor="ctr"/>
+          <a:lstStyle/>
+          <a:p>
+            <a:pPr algn="ctr"/>
+          </a:p>
+        </p:txBody>
+      </p:sp>
+      <p:sp>
+        <p:nvSpPr>
+          <p:cNvPr id="9" name="TextBox 8"/>
+          <p:cNvSpPr txBox="1"/>
+          <p:nvPr/>
+        </p:nvSpPr>
+        <p:spPr>
+          <a:xfrm>
+            <a:off x="4754880" y="1074420"/>
+            <a:ext cx="4023360" cy="228600"/>
+          </a:xfrm>
+          <a:prstGeom prst="rect">
+            <a:avLst/>
+          </a:prstGeom>
+          <a:noFill/>
+        </p:spPr>
+        <p:txBody>
+          <a:bodyPr wrap="square">
+            <a:spAutoFit/>
+          </a:bodyPr>
+          <a:lstStyle/>
+          <a:p>
+            <a:r>
+              <a:rPr sz="1400" b="0">
+                <a:solidFill>
+                  <a:srgbClr val="EC4899"/>
+                </a:solidFill>
+                <a:latin typeface="Arial Black"/>
+              </a:rPr>
+              <a:t>Why DBCV Is Needed</a:t>
+            </a:r>
+          </a:p>
+        </p:txBody>
+      </p:sp>
+      <p:sp>
+        <p:nvSpPr>
+          <p:cNvPr id="10" name="TextBox 9"/>
+          <p:cNvSpPr txBox="1"/>
+          <p:nvPr/>
+        </p:nvSpPr>
+        <p:spPr>
+          <a:xfrm>
+            <a:off x="4754880" y="1280160"/>
+            <a:ext cx="4023360" cy="2308860"/>
+          </a:xfrm>
+          <a:prstGeom prst="rect">
+            <a:avLst/>
+          </a:prstGeom>
+          <a:noFill/>
+        </p:spPr>
+        <p:txBody>
+          <a:bodyPr wrap="square">
+            <a:spAutoFit/>
+          </a:bodyPr>
+          <a:lstStyle/>
+          <a:p>
+            <a:r>
+              <a:rPr sz="1100">
+                <a:solidFill>
+                  <a:srgbClr val="CADCFC"/>
+                </a:solidFill>
+                <a:latin typeface="Calibri"/>
+              </a:rPr>
+              <a:t>Circular evaluation: Selecting HDBSCAN parameters by ARI (ground-truth labels) is cheating — those labels won't exist in production.
+Shape assumptions: Silhouette Score assumes convex clusters. HDBSCAN discovers arbitrary shapes.
+Noise-aware: DBCV works with HDBSCAN's noise model; standard metrics don't handle noise points.</a:t>
+            </a:r>
+          </a:p>
+        </p:txBody>
+      </p:sp>
+      <p:graphicFrame>
+        <p:nvGraphicFramePr>
+          <p:cNvPr id="11" name="Table 10"/>
+          <p:cNvGraphicFramePr>
+            <a:graphicFrameLocks noGrp="1"/>
+          </p:cNvGraphicFramePr>
+          <p:nvPr/>
+        </p:nvGraphicFramePr>
+        <p:xfrm>
+          <a:off x="1828800" y="3840480"/>
+          <a:ext cx="5486400" cy="1371600"/>
+        </p:xfrm>
+        <a:graphic>
+          <a:graphicData uri="http://schemas.openxmlformats.org/drawingml/2006/table">
+            <a:tbl>
+              <a:tblPr firstRow="1" bandRow="1">
+                <a:tableStyleId>{5C22544A-7EE6-4342-B048-85BDC9FD1C3A}</a:tableStyleId>
+              </a:tblPr>
+              <a:tblGrid>
+                <a:gridCol w="1828800"/>
+                <a:gridCol w="3657600"/>
+              </a:tblGrid>
+              <a:tr h="274320">
+                <a:tc>
+                  <a:txBody>
+                    <a:bodyPr/>
+                    <a:lstStyle/>
+                    <a:p>
+                      <a:r>
+                        <a:rPr sz="1000" b="1">
+                          <a:solidFill>
+                            <a:srgbClr val="FFFFFF"/>
+                          </a:solidFill>
+                          <a:latin typeface="Calibri"/>
+                        </a:rPr>
+                        <a:t>DBCV Range</a:t>
+                      </a:r>
+                    </a:p>
+                  </a:txBody>
+                  <a:tcPr>
+                    <a:solidFill>
+                      <a:srgbClr val="334055"/>
+                    </a:solidFill>
+                  </a:tcPr>
+                </a:tc>
+                <a:tc>
+                  <a:txBody>
+                    <a:bodyPr/>
+                    <a:lstStyle/>
+                    <a:p>
+                      <a:r>
+                        <a:rPr sz="1000" b="1">
+                          <a:solidFill>
+                            <a:srgbClr val="FFFFFF"/>
+                          </a:solidFill>
+                          <a:latin typeface="Calibri"/>
+                        </a:rPr>
+                        <a:t>Interpretation</a:t>
+                      </a:r>
+                    </a:p>
+                  </a:txBody>
+                  <a:tcPr>
+                    <a:solidFill>
+                      <a:srgbClr val="334055"/>
+                    </a:solidFill>
+                  </a:tcPr>
+                </a:tc>
+              </a:tr>
+              <a:tr h="274320">
+                <a:tc>
+                  <a:txBody>
+                    <a:bodyPr/>
+                    <a:lstStyle/>
+                    <a:p>
+                      <a:r>
+                        <a:rPr sz="1000">
+                          <a:solidFill>
+                            <a:srgbClr val="CADCFC"/>
+                          </a:solidFill>
+                          <a:latin typeface="Calibri"/>
+                        </a:rPr>
+                        <a:t>0.75 – 1.0</a:t>
+                      </a:r>
+                    </a:p>
+                  </a:txBody>
+                  <a:tcPr>
+                    <a:solidFill>
+                      <a:srgbClr val="162133"/>
+                    </a:solidFill>
+                  </a:tcPr>
+                </a:tc>
+                <a:tc>
+                  <a:txBody>
+                    <a:bodyPr/>
+                    <a:lstStyle/>
+                    <a:p>
+                      <a:r>
+                        <a:rPr sz="1000">
+                          <a:solidFill>
+                            <a:srgbClr val="CADCFC"/>
+                          </a:solidFill>
+                          <a:latin typeface="Calibri"/>
+                        </a:rPr>
+                        <a:t>Excellent — dense, well-separated clusters</a:t>
+                      </a:r>
+                    </a:p>
+                  </a:txBody>
+                  <a:tcPr>
+                    <a:solidFill>
+                      <a:srgbClr val="162133"/>
+                    </a:solidFill>
+                  </a:tcPr>
+                </a:tc>
+              </a:tr>
+              <a:tr h="274320">
+                <a:tc>
+                  <a:txBody>
+                    <a:bodyPr/>
+                    <a:lstStyle/>
+                    <a:p>
+                      <a:r>
+                        <a:rPr sz="1000">
+                          <a:solidFill>
+                            <a:srgbClr val="CADCFC"/>
+                          </a:solidFill>
+                          <a:latin typeface="Calibri"/>
+                        </a:rPr>
+                        <a:t>0.50 – 0.75</a:t>
+                      </a:r>
+                    </a:p>
+                  </a:txBody>
+                  <a:tcPr>
+                    <a:solidFill>
+                      <a:srgbClr val="1E293B"/>
+                    </a:solidFill>
+                  </a:tcPr>
+                </a:tc>
+                <a:tc>
+                  <a:txBody>
+                    <a:bodyPr/>
+                    <a:lstStyle/>
+                    <a:p>
+                      <a:r>
+                        <a:rPr sz="1000">
+                          <a:solidFill>
+                            <a:srgbClr val="CADCFC"/>
+                          </a:solidFill>
+                          <a:latin typeface="Calibri"/>
+                        </a:rPr>
+                        <a:t>Good — clear density structure</a:t>
+                      </a:r>
+                    </a:p>
+                  </a:txBody>
+                  <a:tcPr>
+                    <a:solidFill>
+                      <a:srgbClr val="1E293B"/>
+                    </a:solidFill>
+                  </a:tcPr>
+                </a:tc>
+              </a:tr>
+              <a:tr h="274320">
+                <a:tc>
+                  <a:txBody>
+                    <a:bodyPr/>
+                    <a:lstStyle/>
+                    <a:p>
+                      <a:r>
+                        <a:rPr sz="1000">
+                          <a:solidFill>
+                            <a:srgbClr val="CADCFC"/>
+                          </a:solidFill>
+                          <a:latin typeface="Calibri"/>
+                        </a:rPr>
+                        <a:t>0.25 – 0.50</a:t>
+                      </a:r>
+                    </a:p>
+                  </a:txBody>
+                  <a:tcPr>
+                    <a:solidFill>
+                      <a:srgbClr val="162133"/>
+                    </a:solidFill>
+                  </a:tcPr>
+                </a:tc>
+                <a:tc>
+                  <a:txBody>
+                    <a:bodyPr/>
+                    <a:lstStyle/>
+                    <a:p>
+                      <a:r>
+                        <a:rPr sz="1000">
+                          <a:solidFill>
+                            <a:srgbClr val="CADCFC"/>
+                          </a:solidFill>
+                          <a:latin typeface="Calibri"/>
+                        </a:rPr>
+                        <a:t>Moderate — some cluster overlap</a:t>
+                      </a:r>
+                    </a:p>
+                  </a:txBody>
+                  <a:tcPr>
+                    <a:solidFill>
+                      <a:srgbClr val="162133"/>
+                    </a:solidFill>
+                  </a:tcPr>
+                </a:tc>
+              </a:tr>
+              <a:tr h="274320">
+                <a:tc>
+                  <a:txBody>
+                    <a:bodyPr/>
+                    <a:lstStyle/>
+                    <a:p>
+                      <a:r>
+                        <a:rPr sz="1000">
+                          <a:solidFill>
+                            <a:srgbClr val="CADCFC"/>
+                          </a:solidFill>
+                          <a:latin typeface="Calibri"/>
+                        </a:rPr>
+                        <a:t>&lt; 0.25</a:t>
+                      </a:r>
+                    </a:p>
+                  </a:txBody>
+                  <a:tcPr>
+                    <a:solidFill>
+                      <a:srgbClr val="1E293B"/>
+                    </a:solidFill>
+                  </a:tcPr>
+                </a:tc>
+                <a:tc>
+                  <a:txBody>
+                    <a:bodyPr/>
+                    <a:lstStyle/>
+                    <a:p>
+                      <a:r>
+                        <a:rPr sz="1000">
+                          <a:solidFill>
+                            <a:srgbClr val="CADCFC"/>
+                          </a:solidFill>
+                          <a:latin typeface="Calibri"/>
+                        </a:rPr>
+                        <a:t>Weak to poor — clusters not well-defined</a:t>
+                      </a:r>
+                    </a:p>
+                  </a:txBody>
+                  <a:tcPr>
+                    <a:solidFill>
+                      <a:srgbClr val="1E293B"/>
+                    </a:solidFill>
+                  </a:tcPr>
+                </a:tc>
+              </a:tr>
+            </a:tbl>
+          </a:graphicData>
+        </a:graphic>
+      </p:graphicFrame>
+    </p:spTree>
+  </p:cSld>
+  <p:clrMapOvr>
+    <a:masterClrMapping/>
+  </p:clrMapOvr>
+</p:sld>
+</file>
+
+<file path=ppt/slides/slide19.xml><?xml version="1.0" encoding="utf-8"?>
+<p:sld xmlns:a="http://schemas.openxmlformats.org/drawingml/2006/main" xmlns:p="http://schemas.openxmlformats.org/presentationml/2006/main" xmlns:r="http://schemas.openxmlformats.org/officeDocument/2006/relationships">
+  <p:cSld>
+    <p:bg>
+      <p:bgPr>
+        <a:solidFill>
+          <a:srgbClr val="0F172A"/>
+        </a:solidFill>
+        <a:effectLst/>
+      </p:bgPr>
+    </p:bg>
+    <p:spTree>
+      <p:nvGrpSpPr>
+        <p:cNvPr id="1" name=""/>
+        <p:cNvGrpSpPr/>
+        <p:nvPr/>
+      </p:nvGrpSpPr>
+      <p:grpSpPr/>
+      <p:sp>
+        <p:nvSpPr>
+          <p:cNvPr id="2" name="Rectangle 1"/>
+          <p:cNvSpPr/>
+          <p:nvPr/>
+        </p:nvSpPr>
+        <p:spPr>
+          <a:xfrm>
+            <a:off x="0" y="0"/>
+            <a:ext cx="9144000" cy="54864"/>
+          </a:xfrm>
+          <a:prstGeom prst="rect">
+            <a:avLst/>
+          </a:prstGeom>
+          <a:solidFill>
+            <a:srgbClr val="F97316"/>
+          </a:solidFill>
+          <a:ln>
+            <a:noFill/>
+          </a:ln>
+        </p:spPr>
+        <p:style>
+          <a:lnRef idx="1">
+            <a:schemeClr val="accent1"/>
+          </a:lnRef>
+          <a:fillRef idx="3">
+            <a:schemeClr val="accent1"/>
+          </a:fillRef>
+          <a:effectRef idx="2">
+            <a:schemeClr val="accent1"/>
+          </a:effectRef>
+          <a:fontRef idx="minor">
+            <a:schemeClr val="lt1"/>
+          </a:fontRef>
+        </p:style>
+        <p:txBody>
+          <a:bodyPr rtlCol="0" anchor="ctr"/>
+          <a:lstStyle/>
+          <a:p>
+            <a:pPr algn="ctr"/>
+          </a:p>
+        </p:txBody>
+      </p:sp>
+      <p:sp>
+        <p:nvSpPr>
+          <p:cNvPr id="3" name="Rounded Rectangle 2"/>
+          <p:cNvSpPr/>
+          <p:nvPr/>
+        </p:nvSpPr>
+        <p:spPr>
+          <a:xfrm>
+            <a:off x="457200" y="182880"/>
+            <a:ext cx="640080" cy="457200"/>
+          </a:xfrm>
+          <a:prstGeom prst="roundRect">
+            <a:avLst/>
+          </a:prstGeom>
+          <a:solidFill>
+            <a:srgbClr val="F97316"/>
+          </a:solidFill>
+          <a:ln>
+            <a:noFill/>
+          </a:ln>
+        </p:spPr>
+        <p:style>
+          <a:lnRef idx="1">
+            <a:schemeClr val="accent1"/>
+          </a:lnRef>
+          <a:fillRef idx="3">
+            <a:schemeClr val="accent1"/>
+          </a:fillRef>
+          <a:effectRef idx="2">
+            <a:schemeClr val="accent1"/>
+          </a:effectRef>
+          <a:fontRef idx="minor">
+            <a:schemeClr val="lt1"/>
+          </a:fontRef>
+        </p:style>
+        <p:txBody>
+          <a:bodyPr rtlCol="0" anchor="ctr" wrap="square"/>
+          <a:lstStyle/>
+          <a:p>
+            <a:pPr algn="ctr"/>
+            <a:r>
+              <a:rPr sz="2000">
+                <a:solidFill>
+                  <a:srgbClr val="FFFFFF"/>
+                </a:solidFill>
+                <a:latin typeface="Arial Black"/>
+              </a:rPr>
+              <a:t>FT</a:t>
+            </a:r>
+          </a:p>
+        </p:txBody>
+      </p:sp>
+      <p:sp>
+        <p:nvSpPr>
+          <p:cNvPr id="4" name="TextBox 3"/>
+          <p:cNvSpPr txBox="1"/>
+          <p:nvPr/>
+        </p:nvSpPr>
+        <p:spPr>
+          <a:xfrm>
+            <a:off x="1280160" y="182880"/>
+            <a:ext cx="7315200" cy="457200"/>
+          </a:xfrm>
+          <a:prstGeom prst="rect">
+            <a:avLst/>
+          </a:prstGeom>
+          <a:noFill/>
+        </p:spPr>
+        <p:txBody>
+          <a:bodyPr wrap="square">
+            <a:spAutoFit/>
+          </a:bodyPr>
+          <a:lstStyle/>
+          <a:p>
+            <a:r>
+              <a:rPr sz="2800" b="0">
+                <a:solidFill>
+                  <a:srgbClr val="FFFFFF"/>
+                </a:solidFill>
+                <a:latin typeface="Arial Black"/>
+              </a:rPr>
+              <a:t>Fine-Tuning Results (v2 Pipeline)</a:t>
+            </a:r>
+          </a:p>
+        </p:txBody>
+      </p:sp>
+      <p:sp>
+        <p:nvSpPr>
+          <p:cNvPr id="5" name="TextBox 4"/>
+          <p:cNvSpPr txBox="1"/>
+          <p:nvPr/>
+        </p:nvSpPr>
+        <p:spPr>
+          <a:xfrm>
+            <a:off x="1280160" y="640080"/>
+            <a:ext cx="7315200" cy="320040"/>
+          </a:xfrm>
+          <a:prstGeom prst="rect">
+            <a:avLst/>
+          </a:prstGeom>
+          <a:noFill/>
+        </p:spPr>
+        <p:txBody>
+          <a:bodyPr wrap="square">
+            <a:spAutoFit/>
+          </a:bodyPr>
+          <a:lstStyle/>
+          <a:p>
+            <a:r>
+              <a:rPr sz="1300">
+                <a:solidFill>
+                  <a:srgbClr val="94A3B8"/>
+                </a:solidFill>
+                <a:latin typeface="Calibri"/>
+              </a:rPr>
+              <a:t>Base all-MiniLM-L6-v2 vs fine-tuned model — each with its own DBCV-optimal HDBSCAN parameters</a:t>
+            </a:r>
+          </a:p>
+        </p:txBody>
+      </p:sp>
+      <p:graphicFrame>
+        <p:nvGraphicFramePr>
+          <p:cNvPr id="6" name="Table 5"/>
+          <p:cNvGraphicFramePr>
+            <a:graphicFrameLocks noGrp="1"/>
+          </p:cNvGraphicFramePr>
+          <p:nvPr/>
+        </p:nvGraphicFramePr>
+        <p:xfrm>
+          <a:off x="457200" y="1005840"/>
+          <a:ext cx="8229600" cy="2468880"/>
+        </p:xfrm>
+        <a:graphic>
+          <a:graphicData uri="http://schemas.openxmlformats.org/drawingml/2006/table">
+            <a:tbl>
+              <a:tblPr firstRow="1" bandRow="1">
+                <a:tableStyleId>{5C22544A-7EE6-4342-B048-85BDC9FD1C3A}</a:tableStyleId>
+              </a:tblPr>
+              <a:tblGrid>
+                <a:gridCol w="3200400"/>
+                <a:gridCol w="1676400"/>
+                <a:gridCol w="1676400"/>
+                <a:gridCol w="1676400"/>
+              </a:tblGrid>
+              <a:tr h="274320">
+                <a:tc>
+                  <a:txBody>
+                    <a:bodyPr/>
+                    <a:lstStyle/>
+                    <a:p>
+                      <a:r>
+                        <a:rPr sz="1000" b="1">
+                          <a:solidFill>
+                            <a:srgbClr val="FFFFFF"/>
+                          </a:solidFill>
+                          <a:latin typeface="Calibri"/>
+                        </a:rPr>
+                        <a:t>Metric</a:t>
+                      </a:r>
+                    </a:p>
+                  </a:txBody>
+                  <a:tcPr>
+                    <a:solidFill>
+                      <a:srgbClr val="334055"/>
+                    </a:solidFill>
+                  </a:tcPr>
+                </a:tc>
+                <a:tc>
+                  <a:txBody>
+                    <a:bodyPr/>
+                    <a:lstStyle/>
+                    <a:p>
+                      <a:r>
+                        <a:rPr sz="1000" b="1">
+                          <a:solidFill>
+                            <a:srgbClr val="FFFFFF"/>
+                          </a:solidFill>
+                          <a:latin typeface="Calibri"/>
+                        </a:rPr>
+                        <a:t>Base Model</a:t>
+                      </a:r>
+                    </a:p>
+                  </a:txBody>
+                  <a:tcPr>
+                    <a:solidFill>
+                      <a:srgbClr val="334055"/>
+                    </a:solidFill>
+                  </a:tcPr>
+                </a:tc>
+                <a:tc>
+                  <a:txBody>
+                    <a:bodyPr/>
+                    <a:lstStyle/>
+                    <a:p>
+                      <a:r>
+                        <a:rPr sz="1000" b="1">
+                          <a:solidFill>
+                            <a:srgbClr val="FFFFFF"/>
+                          </a:solidFill>
+                          <a:latin typeface="Calibri"/>
+                        </a:rPr>
+                        <a:t>Fine-Tuned</a:t>
+                      </a:r>
+                    </a:p>
+                  </a:txBody>
+                  <a:tcPr>
+                    <a:solidFill>
+                      <a:srgbClr val="334055"/>
+                    </a:solidFill>
+                  </a:tcPr>
+                </a:tc>
+                <a:tc>
+                  <a:txBody>
+                    <a:bodyPr/>
+                    <a:lstStyle/>
+                    <a:p>
+                      <a:r>
+                        <a:rPr sz="1000" b="1">
+                          <a:solidFill>
+                            <a:srgbClr val="FFFFFF"/>
+                          </a:solidFill>
+                          <a:latin typeface="Calibri"/>
+                        </a:rPr>
+                        <a:t>Delta</a:t>
+                      </a:r>
+                    </a:p>
+                  </a:txBody>
+                  <a:tcPr>
+                    <a:solidFill>
+                      <a:srgbClr val="334055"/>
+                    </a:solidFill>
+                  </a:tcPr>
+                </a:tc>
+              </a:tr>
+              <a:tr h="274320">
+                <a:tc>
+                  <a:txBody>
+                    <a:bodyPr/>
+                    <a:lstStyle/>
+                    <a:p>
+                      <a:r>
+                        <a:rPr sz="1000">
+                          <a:solidFill>
+                            <a:srgbClr val="CADCFC"/>
+                          </a:solidFill>
+                          <a:latin typeface="Calibri"/>
+                        </a:rPr>
+                        <a:t>DBCV (internal)</a:t>
+                      </a:r>
+                    </a:p>
+                  </a:txBody>
+                  <a:tcPr>
+                    <a:solidFill>
+                      <a:srgbClr val="162133"/>
+                    </a:solidFill>
+                  </a:tcPr>
+                </a:tc>
+                <a:tc>
+                  <a:txBody>
+                    <a:bodyPr/>
+                    <a:lstStyle/>
+                    <a:p>
+                      <a:r>
+                        <a:rPr sz="1000">
+                          <a:solidFill>
+                            <a:srgbClr val="CADCFC"/>
+                          </a:solidFill>
+                          <a:latin typeface="Calibri"/>
+                        </a:rPr>
+                        <a:t>—</a:t>
+                      </a:r>
+                    </a:p>
+                  </a:txBody>
+                  <a:tcPr>
+                    <a:solidFill>
+                      <a:srgbClr val="162133"/>
+                    </a:solidFill>
+                  </a:tcPr>
+                </a:tc>
+                <a:tc>
+                  <a:txBody>
+                    <a:bodyPr/>
+                    <a:lstStyle/>
+                    <a:p>
+                      <a:r>
+                        <a:rPr sz="1000">
+                          <a:solidFill>
+                            <a:srgbClr val="CADCFC"/>
+                          </a:solidFill>
+                          <a:latin typeface="Calibri"/>
+                        </a:rPr>
+                        <a:t>—</a:t>
+                      </a:r>
+                    </a:p>
+                  </a:txBody>
+                  <a:tcPr>
+                    <a:solidFill>
+                      <a:srgbClr val="162133"/>
+                    </a:solidFill>
+                  </a:tcPr>
+                </a:tc>
+                <a:tc>
+                  <a:txBody>
+                    <a:bodyPr/>
+                    <a:lstStyle/>
+                    <a:p>
+                      <a:r>
+                        <a:rPr sz="1000">
+                          <a:solidFill>
+                            <a:srgbClr val="CADCFC"/>
+                          </a:solidFill>
+                          <a:latin typeface="Calibri"/>
+                        </a:rPr>
+                        <a:t>—</a:t>
+                      </a:r>
+                    </a:p>
+                  </a:txBody>
+                  <a:tcPr>
+                    <a:solidFill>
+                      <a:srgbClr val="162133"/>
+                    </a:solidFill>
+                  </a:tcPr>
+                </a:tc>
+              </a:tr>
+              <a:tr h="274320">
+                <a:tc>
+                  <a:txBody>
+                    <a:bodyPr/>
+                    <a:lstStyle/>
+                    <a:p>
+                      <a:r>
+                        <a:rPr sz="1000">
+                          <a:solidFill>
+                            <a:srgbClr val="CADCFC"/>
+                          </a:solidFill>
+                          <a:latin typeface="Calibri"/>
+                        </a:rPr>
+                        <a:t>ARI vs Intent (full dataset)</a:t>
+                      </a:r>
+                    </a:p>
+                  </a:txBody>
+                  <a:tcPr>
+                    <a:solidFill>
+                      <a:srgbClr val="1E293B"/>
+                    </a:solidFill>
+                  </a:tcPr>
+                </a:tc>
+                <a:tc>
+                  <a:txBody>
+                    <a:bodyPr/>
+                    <a:lstStyle/>
+                    <a:p>
+                      <a:r>
+                        <a:rPr sz="1000">
+                          <a:solidFill>
+                            <a:srgbClr val="CADCFC"/>
+                          </a:solidFill>
+                          <a:latin typeface="Calibri"/>
+                        </a:rPr>
+                        <a:t>—</a:t>
+                      </a:r>
+                    </a:p>
+                  </a:txBody>
+                  <a:tcPr>
+                    <a:solidFill>
+                      <a:srgbClr val="1E293B"/>
+                    </a:solidFill>
+                  </a:tcPr>
+                </a:tc>
+                <a:tc>
+                  <a:txBody>
+                    <a:bodyPr/>
+                    <a:lstStyle/>
+                    <a:p>
+                      <a:r>
+                        <a:rPr sz="1000">
+                          <a:solidFill>
+                            <a:srgbClr val="CADCFC"/>
+                          </a:solidFill>
+                          <a:latin typeface="Calibri"/>
+                        </a:rPr>
+                        <a:t>—</a:t>
+                      </a:r>
+                    </a:p>
+                  </a:txBody>
+                  <a:tcPr>
+                    <a:solidFill>
+                      <a:srgbClr val="1E293B"/>
+                    </a:solidFill>
+                  </a:tcPr>
+                </a:tc>
+                <a:tc>
+                  <a:txBody>
+                    <a:bodyPr/>
+                    <a:lstStyle/>
+                    <a:p>
+                      <a:r>
+                        <a:rPr sz="1000">
+                          <a:solidFill>
+                            <a:srgbClr val="CADCFC"/>
+                          </a:solidFill>
+                          <a:latin typeface="Calibri"/>
+                        </a:rPr>
+                        <a:t>—</a:t>
+                      </a:r>
+                    </a:p>
+                  </a:txBody>
+                  <a:tcPr>
+                    <a:solidFill>
+                      <a:srgbClr val="1E293B"/>
+                    </a:solidFill>
+                  </a:tcPr>
+                </a:tc>
+              </a:tr>
+              <a:tr h="274320">
+                <a:tc>
+                  <a:txBody>
+                    <a:bodyPr/>
+                    <a:lstStyle/>
+                    <a:p>
+                      <a:r>
+                        <a:rPr sz="1000">
+                          <a:solidFill>
+                            <a:srgbClr val="CADCFC"/>
+                          </a:solidFill>
+                          <a:latin typeface="Calibri"/>
+                        </a:rPr>
+                        <a:t>NMI vs Intent (full dataset)</a:t>
+                      </a:r>
+                    </a:p>
+                  </a:txBody>
+                  <a:tcPr>
+                    <a:solidFill>
+                      <a:srgbClr val="162133"/>
+                    </a:solidFill>
+                  </a:tcPr>
+                </a:tc>
+                <a:tc>
+                  <a:txBody>
+                    <a:bodyPr/>
+                    <a:lstStyle/>
+                    <a:p>
+                      <a:r>
+                        <a:rPr sz="1000">
+                          <a:solidFill>
+                            <a:srgbClr val="CADCFC"/>
+                          </a:solidFill>
+                          <a:latin typeface="Calibri"/>
+                        </a:rPr>
+                        <a:t>—</a:t>
+                      </a:r>
+                    </a:p>
+                  </a:txBody>
+                  <a:tcPr>
+                    <a:solidFill>
+                      <a:srgbClr val="162133"/>
+                    </a:solidFill>
+                  </a:tcPr>
+                </a:tc>
+                <a:tc>
+                  <a:txBody>
+                    <a:bodyPr/>
+                    <a:lstStyle/>
+                    <a:p>
+                      <a:r>
+                        <a:rPr sz="1000">
+                          <a:solidFill>
+                            <a:srgbClr val="CADCFC"/>
+                          </a:solidFill>
+                          <a:latin typeface="Calibri"/>
+                        </a:rPr>
+                        <a:t>—</a:t>
+                      </a:r>
+                    </a:p>
+                  </a:txBody>
+                  <a:tcPr>
+                    <a:solidFill>
+                      <a:srgbClr val="162133"/>
+                    </a:solidFill>
+                  </a:tcPr>
+                </a:tc>
+                <a:tc>
+                  <a:txBody>
+                    <a:bodyPr/>
+                    <a:lstStyle/>
+                    <a:p>
+                      <a:r>
+                        <a:rPr sz="1000">
+                          <a:solidFill>
+                            <a:srgbClr val="CADCFC"/>
+                          </a:solidFill>
+                          <a:latin typeface="Calibri"/>
+                        </a:rPr>
+                        <a:t>—</a:t>
+                      </a:r>
+                    </a:p>
+                  </a:txBody>
+                  <a:tcPr>
+                    <a:solidFill>
+                      <a:srgbClr val="162133"/>
+                    </a:solidFill>
+                  </a:tcPr>
+                </a:tc>
+              </a:tr>
+              <a:tr h="274320">
+                <a:tc>
+                  <a:txBody>
+                    <a:bodyPr/>
+                    <a:lstStyle/>
+                    <a:p>
+                      <a:r>
+                        <a:rPr sz="1000">
+                          <a:solidFill>
+                            <a:srgbClr val="CADCFC"/>
+                          </a:solidFill>
+                          <a:latin typeface="Calibri"/>
+                        </a:rPr>
+                        <a:t>ARI vs Category (full dataset)</a:t>
+                      </a:r>
+                    </a:p>
+                  </a:txBody>
+                  <a:tcPr>
+                    <a:solidFill>
+                      <a:srgbClr val="1E293B"/>
+                    </a:solidFill>
+                  </a:tcPr>
+                </a:tc>
+                <a:tc>
+                  <a:txBody>
+                    <a:bodyPr/>
+                    <a:lstStyle/>
+                    <a:p>
+                      <a:r>
+                        <a:rPr sz="1000">
+                          <a:solidFill>
+                            <a:srgbClr val="CADCFC"/>
+                          </a:solidFill>
+                          <a:latin typeface="Calibri"/>
+                        </a:rPr>
+                        <a:t>—</a:t>
+                      </a:r>
+                    </a:p>
+                  </a:txBody>
+                  <a:tcPr>
+                    <a:solidFill>
+                      <a:srgbClr val="1E293B"/>
+                    </a:solidFill>
+                  </a:tcPr>
+                </a:tc>
+                <a:tc>
+                  <a:txBody>
+                    <a:bodyPr/>
+                    <a:lstStyle/>
+                    <a:p>
+                      <a:r>
+                        <a:rPr sz="1000">
+                          <a:solidFill>
+                            <a:srgbClr val="CADCFC"/>
+                          </a:solidFill>
+                          <a:latin typeface="Calibri"/>
+                        </a:rPr>
+                        <a:t>—</a:t>
+                      </a:r>
+                    </a:p>
+                  </a:txBody>
+                  <a:tcPr>
+                    <a:solidFill>
+                      <a:srgbClr val="1E293B"/>
+                    </a:solidFill>
+                  </a:tcPr>
+                </a:tc>
+                <a:tc>
+                  <a:txBody>
+                    <a:bodyPr/>
+                    <a:lstStyle/>
+                    <a:p>
+                      <a:r>
+                        <a:rPr sz="1000">
+                          <a:solidFill>
+                            <a:srgbClr val="CADCFC"/>
+                          </a:solidFill>
+                          <a:latin typeface="Calibri"/>
+                        </a:rPr>
+                        <a:t>—</a:t>
+                      </a:r>
+                    </a:p>
+                  </a:txBody>
+                  <a:tcPr>
+                    <a:solidFill>
+                      <a:srgbClr val="1E293B"/>
+                    </a:solidFill>
+                  </a:tcPr>
+                </a:tc>
+              </a:tr>
+              <a:tr h="274320">
+                <a:tc>
+                  <a:txBody>
+                    <a:bodyPr/>
+                    <a:lstStyle/>
+                    <a:p>
+                      <a:r>
+                        <a:rPr sz="1000">
+                          <a:solidFill>
+                            <a:srgbClr val="CADCFC"/>
+                          </a:solidFill>
+                          <a:latin typeface="Calibri"/>
+                        </a:rPr>
+                        <a:t>Clusters Found</a:t>
+                      </a:r>
+                    </a:p>
+                  </a:txBody>
+                  <a:tcPr>
+                    <a:solidFill>
+                      <a:srgbClr val="162133"/>
+                    </a:solidFill>
+                  </a:tcPr>
+                </a:tc>
+                <a:tc>
+                  <a:txBody>
+                    <a:bodyPr/>
+                    <a:lstStyle/>
+                    <a:p>
+                      <a:r>
+                        <a:rPr sz="1000">
+                          <a:solidFill>
+                            <a:srgbClr val="CADCFC"/>
+                          </a:solidFill>
+                          <a:latin typeface="Calibri"/>
+                        </a:rPr>
+                        <a:t>—</a:t>
+                      </a:r>
+                    </a:p>
+                  </a:txBody>
+                  <a:tcPr>
+                    <a:solidFill>
+                      <a:srgbClr val="162133"/>
+                    </a:solidFill>
+                  </a:tcPr>
+                </a:tc>
+                <a:tc>
+                  <a:txBody>
+                    <a:bodyPr/>
+                    <a:lstStyle/>
+                    <a:p>
+                      <a:r>
+                        <a:rPr sz="1000">
+                          <a:solidFill>
+                            <a:srgbClr val="CADCFC"/>
+                          </a:solidFill>
+                          <a:latin typeface="Calibri"/>
+                        </a:rPr>
+                        <a:t>—</a:t>
+                      </a:r>
+                    </a:p>
+                  </a:txBody>
+                  <a:tcPr>
+                    <a:solidFill>
+                      <a:srgbClr val="162133"/>
+                    </a:solidFill>
+                  </a:tcPr>
+                </a:tc>
+                <a:tc>
+                  <a:txBody>
+                    <a:bodyPr/>
+                    <a:lstStyle/>
+                    <a:p>
+                      <a:r>
+                        <a:rPr sz="1000">
+                          <a:solidFill>
+                            <a:srgbClr val="CADCFC"/>
+                          </a:solidFill>
+                          <a:latin typeface="Calibri"/>
+                        </a:rPr>
+                        <a:t>—</a:t>
+                      </a:r>
+                    </a:p>
+                  </a:txBody>
+                  <a:tcPr>
+                    <a:solidFill>
+                      <a:srgbClr val="162133"/>
+                    </a:solidFill>
+                  </a:tcPr>
+                </a:tc>
+              </a:tr>
+              <a:tr h="274320">
+                <a:tc>
+                  <a:txBody>
+                    <a:bodyPr/>
+                    <a:lstStyle/>
+                    <a:p>
+                      <a:r>
+                        <a:rPr sz="1000">
+                          <a:solidFill>
+                            <a:srgbClr val="CADCFC"/>
+                          </a:solidFill>
+                          <a:latin typeface="Calibri"/>
+                        </a:rPr>
+                        <a:t>Noise %</a:t>
+                      </a:r>
+                    </a:p>
+                  </a:txBody>
+                  <a:tcPr>
+                    <a:solidFill>
+                      <a:srgbClr val="1E293B"/>
+                    </a:solidFill>
+                  </a:tcPr>
+                </a:tc>
+                <a:tc>
+                  <a:txBody>
+                    <a:bodyPr/>
+                    <a:lstStyle/>
+                    <a:p>
+                      <a:r>
+                        <a:rPr sz="1000">
+                          <a:solidFill>
+                            <a:srgbClr val="CADCFC"/>
+                          </a:solidFill>
+                          <a:latin typeface="Calibri"/>
+                        </a:rPr>
+                        <a:t>—</a:t>
+                      </a:r>
+                    </a:p>
+                  </a:txBody>
+                  <a:tcPr>
+                    <a:solidFill>
+                      <a:srgbClr val="1E293B"/>
+                    </a:solidFill>
+                  </a:tcPr>
+                </a:tc>
+                <a:tc>
+                  <a:txBody>
+                    <a:bodyPr/>
+                    <a:lstStyle/>
+                    <a:p>
+                      <a:r>
+                        <a:rPr sz="1000">
+                          <a:solidFill>
+                            <a:srgbClr val="CADCFC"/>
+                          </a:solidFill>
+                          <a:latin typeface="Calibri"/>
+                        </a:rPr>
+                        <a:t>—</a:t>
+                      </a:r>
+                    </a:p>
+                  </a:txBody>
+                  <a:tcPr>
+                    <a:solidFill>
+                      <a:srgbClr val="1E293B"/>
+                    </a:solidFill>
+                  </a:tcPr>
+                </a:tc>
+                <a:tc>
+                  <a:txBody>
+                    <a:bodyPr/>
+                    <a:lstStyle/>
+                    <a:p>
+                      <a:r>
+                        <a:rPr sz="1000">
+                          <a:solidFill>
+                            <a:srgbClr val="CADCFC"/>
+                          </a:solidFill>
+                          <a:latin typeface="Calibri"/>
+                        </a:rPr>
+                        <a:t>—</a:t>
+                      </a:r>
+                    </a:p>
+                  </a:txBody>
+                  <a:tcPr>
+                    <a:solidFill>
+                      <a:srgbClr val="1E293B"/>
+                    </a:solidFill>
+                  </a:tcPr>
+                </a:tc>
+              </a:tr>
+              <a:tr h="274320">
+                <a:tc>
+                  <a:txBody>
+                    <a:bodyPr/>
+                    <a:lstStyle/>
+                    <a:p>
+                      <a:r>
+                        <a:rPr sz="1000">
+                          <a:solidFill>
+                            <a:srgbClr val="CADCFC"/>
+                          </a:solidFill>
+                          <a:latin typeface="Calibri"/>
+                        </a:rPr>
+                        <a:t>Mean Purity (full dataset)</a:t>
+                      </a:r>
+                    </a:p>
+                  </a:txBody>
+                  <a:tcPr>
+                    <a:solidFill>
+                      <a:srgbClr val="162133"/>
+                    </a:solidFill>
+                  </a:tcPr>
+                </a:tc>
+                <a:tc>
+                  <a:txBody>
+                    <a:bodyPr/>
+                    <a:lstStyle/>
+                    <a:p>
+                      <a:r>
+                        <a:rPr sz="1000">
+                          <a:solidFill>
+                            <a:srgbClr val="CADCFC"/>
+                          </a:solidFill>
+                          <a:latin typeface="Calibri"/>
+                        </a:rPr>
+                        <a:t>—</a:t>
+                      </a:r>
+                    </a:p>
+                  </a:txBody>
+                  <a:tcPr>
+                    <a:solidFill>
+                      <a:srgbClr val="162133"/>
+                    </a:solidFill>
+                  </a:tcPr>
+                </a:tc>
+                <a:tc>
+                  <a:txBody>
+                    <a:bodyPr/>
+                    <a:lstStyle/>
+                    <a:p>
+                      <a:r>
+                        <a:rPr sz="1000">
+                          <a:solidFill>
+                            <a:srgbClr val="CADCFC"/>
+                          </a:solidFill>
+                          <a:latin typeface="Calibri"/>
+                        </a:rPr>
+                        <a:t>—</a:t>
+                      </a:r>
+                    </a:p>
+                  </a:txBody>
+                  <a:tcPr>
+                    <a:solidFill>
+                      <a:srgbClr val="162133"/>
+                    </a:solidFill>
+                  </a:tcPr>
+                </a:tc>
+                <a:tc>
+                  <a:txBody>
+                    <a:bodyPr/>
+                    <a:lstStyle/>
+                    <a:p>
+                      <a:r>
+                        <a:rPr sz="1000">
+                          <a:solidFill>
+                            <a:srgbClr val="CADCFC"/>
+                          </a:solidFill>
+                          <a:latin typeface="Calibri"/>
+                        </a:rPr>
+                        <a:t>—</a:t>
+                      </a:r>
+                    </a:p>
+                  </a:txBody>
+                  <a:tcPr>
+                    <a:solidFill>
+                      <a:srgbClr val="162133"/>
+                    </a:solidFill>
+                  </a:tcPr>
+                </a:tc>
+              </a:tr>
+              <a:tr h="274320">
+                <a:tc>
+                  <a:txBody>
+                    <a:bodyPr/>
+                    <a:lstStyle/>
+                    <a:p>
+                      <a:r>
+                        <a:rPr sz="1000">
+                          <a:solidFill>
+                            <a:srgbClr val="CADCFC"/>
+                          </a:solidFill>
+                          <a:latin typeface="Calibri"/>
+                        </a:rPr>
+                        <a:t>Embedding Separation</a:t>
+                      </a:r>
+                    </a:p>
+                  </a:txBody>
+                  <a:tcPr>
+                    <a:solidFill>
+                      <a:srgbClr val="1E293B"/>
+                    </a:solidFill>
+                  </a:tcPr>
+                </a:tc>
+                <a:tc>
+                  <a:txBody>
+                    <a:bodyPr/>
+                    <a:lstStyle/>
+                    <a:p>
+                      <a:r>
+                        <a:rPr sz="1000">
+                          <a:solidFill>
+                            <a:srgbClr val="CADCFC"/>
+                          </a:solidFill>
+                          <a:latin typeface="Calibri"/>
+                        </a:rPr>
+                        <a:t>—</a:t>
+                      </a:r>
+                    </a:p>
+                  </a:txBody>
+                  <a:tcPr>
+                    <a:solidFill>
+                      <a:srgbClr val="1E293B"/>
+                    </a:solidFill>
+                  </a:tcPr>
+                </a:tc>
+                <a:tc>
+                  <a:txBody>
+                    <a:bodyPr/>
+                    <a:lstStyle/>
+                    <a:p>
+                      <a:r>
+                        <a:rPr sz="1000">
+                          <a:solidFill>
+                            <a:srgbClr val="CADCFC"/>
+                          </a:solidFill>
+                          <a:latin typeface="Calibri"/>
+                        </a:rPr>
+                        <a:t>—</a:t>
+                      </a:r>
+                    </a:p>
+                  </a:txBody>
+                  <a:tcPr>
+                    <a:solidFill>
+                      <a:srgbClr val="1E293B"/>
+                    </a:solidFill>
+                  </a:tcPr>
+                </a:tc>
+                <a:tc>
+                  <a:txBody>
+                    <a:bodyPr/>
+                    <a:lstStyle/>
+                    <a:p>
+                      <a:r>
+                        <a:rPr sz="1000">
+                          <a:solidFill>
+                            <a:srgbClr val="CADCFC"/>
+                          </a:solidFill>
+                          <a:latin typeface="Calibri"/>
+                        </a:rPr>
+                        <a:t>—</a:t>
+                      </a:r>
+                    </a:p>
+                  </a:txBody>
+                  <a:tcPr>
+                    <a:solidFill>
+                      <a:srgbClr val="1E293B"/>
+                    </a:solidFill>
+                  </a:tcPr>
+                </a:tc>
+              </a:tr>
+            </a:tbl>
+          </a:graphicData>
+        </a:graphic>
+      </p:graphicFrame>
+      <p:sp>
+        <p:nvSpPr>
+          <p:cNvPr id="7" name="TextBox 6"/>
+          <p:cNvSpPr txBox="1"/>
+          <p:nvPr/>
+        </p:nvSpPr>
+        <p:spPr>
+          <a:xfrm>
+            <a:off x="457200" y="4114800"/>
+            <a:ext cx="8229600" cy="731520"/>
+          </a:xfrm>
+          <a:prstGeom prst="rect">
+            <a:avLst/>
+          </a:prstGeom>
+          <a:noFill/>
+        </p:spPr>
+        <p:txBody>
+          <a:bodyPr wrap="square">
+            <a:spAutoFit/>
+          </a:bodyPr>
+          <a:lstStyle/>
+          <a:p>
+            <a:r>
+              <a:rPr sz="1100">
+                <a:solidFill>
+                  <a:srgbClr val="94A3B8"/>
+                </a:solidFill>
+                <a:latin typeface="Calibri"/>
+              </a:rPr>
+              <a:t/>
+            </a:r>
+            <a:r>
+              <a:rPr b="1" sz="1100">
+                <a:solidFill>
+                  <a:srgbClr val="F97316"/>
+                </a:solidFill>
+                <a:latin typeface="Calibri"/>
+              </a:rPr>
+              <a:t>Note: </a:t>
+            </a:r>
+            <a:r>
+              <a:rPr sz="1100">
+                <a:solidFill>
+                  <a:srgbClr val="94A3B8"/>
+                </a:solidFill>
+                <a:latin typeface="Calibri"/>
+              </a:rPr>
+              <a:t>Values marked '—' will be populated after running finetune_embeddings.ipynb with the v2 pipeline. Each model gets its own DBCV-optimal parameters — no more hardcoded min_cluster_size=500. Full-dataset metrics include noise points assigned via approximate_predict.</a:t>
+            </a:r>
           </a:p>
         </p:txBody>
       </p:sp>
@@ -6306,6 +8676,553 @@
           </a:prstGeom>
         </p:spPr>
       </p:pic>
+    </p:spTree>
+  </p:cSld>
+  <p:clrMapOvr>
+    <a:masterClrMapping/>
+  </p:clrMapOvr>
+</p:sld>
+</file>
+
+<file path=ppt/slides/slide20.xml><?xml version="1.0" encoding="utf-8"?>
+<p:sld xmlns:a="http://schemas.openxmlformats.org/drawingml/2006/main" xmlns:p="http://schemas.openxmlformats.org/presentationml/2006/main" xmlns:r="http://schemas.openxmlformats.org/officeDocument/2006/relationships">
+  <p:cSld>
+    <p:bg>
+      <p:bgPr>
+        <a:solidFill>
+          <a:srgbClr val="0F172A"/>
+        </a:solidFill>
+        <a:effectLst/>
+      </p:bgPr>
+    </p:bg>
+    <p:spTree>
+      <p:nvGrpSpPr>
+        <p:cNvPr id="1" name=""/>
+        <p:cNvGrpSpPr/>
+        <p:nvPr/>
+      </p:nvGrpSpPr>
+      <p:grpSpPr/>
+      <p:sp>
+        <p:nvSpPr>
+          <p:cNvPr id="2" name="Rectangle 1"/>
+          <p:cNvSpPr/>
+          <p:nvPr/>
+        </p:nvSpPr>
+        <p:spPr>
+          <a:xfrm>
+            <a:off x="0" y="0"/>
+            <a:ext cx="9144000" cy="54864"/>
+          </a:xfrm>
+          <a:prstGeom prst="rect">
+            <a:avLst/>
+          </a:prstGeom>
+          <a:solidFill>
+            <a:srgbClr val="F97316"/>
+          </a:solidFill>
+          <a:ln>
+            <a:noFill/>
+          </a:ln>
+        </p:spPr>
+        <p:style>
+          <a:lnRef idx="1">
+            <a:schemeClr val="accent1"/>
+          </a:lnRef>
+          <a:fillRef idx="3">
+            <a:schemeClr val="accent1"/>
+          </a:fillRef>
+          <a:effectRef idx="2">
+            <a:schemeClr val="accent1"/>
+          </a:effectRef>
+          <a:fontRef idx="minor">
+            <a:schemeClr val="lt1"/>
+          </a:fontRef>
+        </p:style>
+        <p:txBody>
+          <a:bodyPr rtlCol="0" anchor="ctr"/>
+          <a:lstStyle/>
+          <a:p>
+            <a:pPr algn="ctr"/>
+          </a:p>
+        </p:txBody>
+      </p:sp>
+      <p:sp>
+        <p:nvSpPr>
+          <p:cNvPr id="3" name="TextBox 2"/>
+          <p:cNvSpPr txBox="1"/>
+          <p:nvPr/>
+        </p:nvSpPr>
+        <p:spPr>
+          <a:xfrm>
+            <a:off x="457200" y="182880"/>
+            <a:ext cx="8229600" cy="457200"/>
+          </a:xfrm>
+          <a:prstGeom prst="rect">
+            <a:avLst/>
+          </a:prstGeom>
+          <a:noFill/>
+        </p:spPr>
+        <p:txBody>
+          <a:bodyPr wrap="square">
+            <a:spAutoFit/>
+          </a:bodyPr>
+          <a:lstStyle/>
+          <a:p>
+            <a:r>
+              <a:rPr sz="2800" b="0">
+                <a:solidFill>
+                  <a:srgbClr val="FFFFFF"/>
+                </a:solidFill>
+                <a:latin typeface="Arial Black"/>
+              </a:rPr>
+              <a:t>Fine-Tuning: Key Takeaways</a:t>
+            </a:r>
+          </a:p>
+        </p:txBody>
+      </p:sp>
+      <p:sp>
+        <p:nvSpPr>
+          <p:cNvPr id="4" name="Rounded Rectangle 3"/>
+          <p:cNvSpPr/>
+          <p:nvPr/>
+        </p:nvSpPr>
+        <p:spPr>
+          <a:xfrm>
+            <a:off x="274320" y="822960"/>
+            <a:ext cx="2651760" cy="2194560"/>
+          </a:xfrm>
+          <a:prstGeom prst="roundRect">
+            <a:avLst/>
+          </a:prstGeom>
+          <a:solidFill>
+            <a:srgbClr val="1E293B"/>
+          </a:solidFill>
+          <a:ln>
+            <a:noFill/>
+          </a:ln>
+        </p:spPr>
+        <p:style>
+          <a:lnRef idx="1">
+            <a:schemeClr val="accent1"/>
+          </a:lnRef>
+          <a:fillRef idx="3">
+            <a:schemeClr val="accent1"/>
+          </a:fillRef>
+          <a:effectRef idx="2">
+            <a:schemeClr val="accent1"/>
+          </a:effectRef>
+          <a:fontRef idx="minor">
+            <a:schemeClr val="lt1"/>
+          </a:fontRef>
+        </p:style>
+        <p:txBody>
+          <a:bodyPr rtlCol="0" anchor="ctr"/>
+          <a:lstStyle/>
+          <a:p>
+            <a:pPr algn="ctr"/>
+          </a:p>
+        </p:txBody>
+      </p:sp>
+      <p:sp>
+        <p:nvSpPr>
+          <p:cNvPr id="5" name="TextBox 4"/>
+          <p:cNvSpPr txBox="1"/>
+          <p:nvPr/>
+        </p:nvSpPr>
+        <p:spPr>
+          <a:xfrm>
+            <a:off x="365760" y="891540"/>
+            <a:ext cx="2468880" cy="228600"/>
+          </a:xfrm>
+          <a:prstGeom prst="rect">
+            <a:avLst/>
+          </a:prstGeom>
+          <a:noFill/>
+        </p:spPr>
+        <p:txBody>
+          <a:bodyPr wrap="square">
+            <a:spAutoFit/>
+          </a:bodyPr>
+          <a:lstStyle/>
+          <a:p>
+            <a:r>
+              <a:rPr sz="1400" b="0">
+                <a:solidFill>
+                  <a:srgbClr val="14B8A6"/>
+                </a:solidFill>
+                <a:latin typeface="Arial Black"/>
+              </a:rPr>
+              <a:t>Tighter Clusters</a:t>
+            </a:r>
+          </a:p>
+        </p:txBody>
+      </p:sp>
+      <p:sp>
+        <p:nvSpPr>
+          <p:cNvPr id="6" name="TextBox 5"/>
+          <p:cNvSpPr txBox="1"/>
+          <p:nvPr/>
+        </p:nvSpPr>
+        <p:spPr>
+          <a:xfrm>
+            <a:off x="365760" y="1097280"/>
+            <a:ext cx="2468880" cy="1851660"/>
+          </a:xfrm>
+          <a:prstGeom prst="rect">
+            <a:avLst/>
+          </a:prstGeom>
+          <a:noFill/>
+        </p:spPr>
+        <p:txBody>
+          <a:bodyPr wrap="square">
+            <a:spAutoFit/>
+          </a:bodyPr>
+          <a:lstStyle/>
+          <a:p>
+            <a:r>
+              <a:rPr sz="1100">
+                <a:solidFill>
+                  <a:srgbClr val="CADCFC"/>
+                </a:solidFill>
+                <a:latin typeface="Calibri"/>
+              </a:rPr>
+              <a:t>Fine-tuning pulls same-intent utterances closer together in embedding space, increasing intra-class cosine similarity and the gap between intra- and inter-class similarity.</a:t>
+            </a:r>
+          </a:p>
+        </p:txBody>
+      </p:sp>
+      <p:sp>
+        <p:nvSpPr>
+          <p:cNvPr id="7" name="Rounded Rectangle 6"/>
+          <p:cNvSpPr/>
+          <p:nvPr/>
+        </p:nvSpPr>
+        <p:spPr>
+          <a:xfrm>
+            <a:off x="3108960" y="822960"/>
+            <a:ext cx="2651760" cy="2194560"/>
+          </a:xfrm>
+          <a:prstGeom prst="roundRect">
+            <a:avLst/>
+          </a:prstGeom>
+          <a:solidFill>
+            <a:srgbClr val="1E293B"/>
+          </a:solidFill>
+          <a:ln>
+            <a:noFill/>
+          </a:ln>
+        </p:spPr>
+        <p:style>
+          <a:lnRef idx="1">
+            <a:schemeClr val="accent1"/>
+          </a:lnRef>
+          <a:fillRef idx="3">
+            <a:schemeClr val="accent1"/>
+          </a:fillRef>
+          <a:effectRef idx="2">
+            <a:schemeClr val="accent1"/>
+          </a:effectRef>
+          <a:fontRef idx="minor">
+            <a:schemeClr val="lt1"/>
+          </a:fontRef>
+        </p:style>
+        <p:txBody>
+          <a:bodyPr rtlCol="0" anchor="ctr"/>
+          <a:lstStyle/>
+          <a:p>
+            <a:pPr algn="ctr"/>
+          </a:p>
+        </p:txBody>
+      </p:sp>
+      <p:sp>
+        <p:nvSpPr>
+          <p:cNvPr id="8" name="TextBox 7"/>
+          <p:cNvSpPr txBox="1"/>
+          <p:nvPr/>
+        </p:nvSpPr>
+        <p:spPr>
+          <a:xfrm>
+            <a:off x="3200400" y="891540"/>
+            <a:ext cx="2468880" cy="228600"/>
+          </a:xfrm>
+          <a:prstGeom prst="rect">
+            <a:avLst/>
+          </a:prstGeom>
+          <a:noFill/>
+        </p:spPr>
+        <p:txBody>
+          <a:bodyPr wrap="square">
+            <a:spAutoFit/>
+          </a:bodyPr>
+          <a:lstStyle/>
+          <a:p>
+            <a:r>
+              <a:rPr sz="1400" b="0">
+                <a:solidFill>
+                  <a:srgbClr val="22C55E"/>
+                </a:solidFill>
+                <a:latin typeface="Arial Black"/>
+              </a:rPr>
+              <a:t>Less Noise</a:t>
+            </a:r>
+          </a:p>
+        </p:txBody>
+      </p:sp>
+      <p:sp>
+        <p:nvSpPr>
+          <p:cNvPr id="9" name="TextBox 8"/>
+          <p:cNvSpPr txBox="1"/>
+          <p:nvPr/>
+        </p:nvSpPr>
+        <p:spPr>
+          <a:xfrm>
+            <a:off x="3200400" y="1097280"/>
+            <a:ext cx="2468880" cy="1851660"/>
+          </a:xfrm>
+          <a:prstGeom prst="rect">
+            <a:avLst/>
+          </a:prstGeom>
+          <a:noFill/>
+        </p:spPr>
+        <p:txBody>
+          <a:bodyPr wrap="square">
+            <a:spAutoFit/>
+          </a:bodyPr>
+          <a:lstStyle/>
+          <a:p>
+            <a:r>
+              <a:rPr sz="1100">
+                <a:solidFill>
+                  <a:srgbClr val="CADCFC"/>
+                </a:solidFill>
+                <a:latin typeface="Calibri"/>
+              </a:rPr>
+              <a:t>The base model had ~18.7% noise; fine-tuning drops this dramatically. v2's full-dataset eval via approximate_predict ensures a fair comparison that doesn't hide hard points.</a:t>
+            </a:r>
+          </a:p>
+        </p:txBody>
+      </p:sp>
+      <p:sp>
+        <p:nvSpPr>
+          <p:cNvPr id="10" name="Rounded Rectangle 9"/>
+          <p:cNvSpPr/>
+          <p:nvPr/>
+        </p:nvSpPr>
+        <p:spPr>
+          <a:xfrm>
+            <a:off x="5943600" y="822960"/>
+            <a:ext cx="2651760" cy="2194560"/>
+          </a:xfrm>
+          <a:prstGeom prst="roundRect">
+            <a:avLst/>
+          </a:prstGeom>
+          <a:solidFill>
+            <a:srgbClr val="1E293B"/>
+          </a:solidFill>
+          <a:ln>
+            <a:noFill/>
+          </a:ln>
+        </p:spPr>
+        <p:style>
+          <a:lnRef idx="1">
+            <a:schemeClr val="accent1"/>
+          </a:lnRef>
+          <a:fillRef idx="3">
+            <a:schemeClr val="accent1"/>
+          </a:fillRef>
+          <a:effectRef idx="2">
+            <a:schemeClr val="accent1"/>
+          </a:effectRef>
+          <a:fontRef idx="minor">
+            <a:schemeClr val="lt1"/>
+          </a:fontRef>
+        </p:style>
+        <p:txBody>
+          <a:bodyPr rtlCol="0" anchor="ctr"/>
+          <a:lstStyle/>
+          <a:p>
+            <a:pPr algn="ctr"/>
+          </a:p>
+        </p:txBody>
+      </p:sp>
+      <p:sp>
+        <p:nvSpPr>
+          <p:cNvPr id="11" name="TextBox 10"/>
+          <p:cNvSpPr txBox="1"/>
+          <p:nvPr/>
+        </p:nvSpPr>
+        <p:spPr>
+          <a:xfrm>
+            <a:off x="6035040" y="891540"/>
+            <a:ext cx="2468880" cy="228600"/>
+          </a:xfrm>
+          <a:prstGeom prst="rect">
+            <a:avLst/>
+          </a:prstGeom>
+          <a:noFill/>
+        </p:spPr>
+        <p:txBody>
+          <a:bodyPr wrap="square">
+            <a:spAutoFit/>
+          </a:bodyPr>
+          <a:lstStyle/>
+          <a:p>
+            <a:r>
+              <a:rPr sz="1400" b="0">
+                <a:solidFill>
+                  <a:srgbClr val="7C3AED"/>
+                </a:solidFill>
+                <a:latin typeface="Arial Black"/>
+              </a:rPr>
+              <a:t>Per-Model Tuning</a:t>
+            </a:r>
+          </a:p>
+        </p:txBody>
+      </p:sp>
+      <p:sp>
+        <p:nvSpPr>
+          <p:cNvPr id="12" name="TextBox 11"/>
+          <p:cNvSpPr txBox="1"/>
+          <p:nvPr/>
+        </p:nvSpPr>
+        <p:spPr>
+          <a:xfrm>
+            <a:off x="6035040" y="1097280"/>
+            <a:ext cx="2468880" cy="1851660"/>
+          </a:xfrm>
+          <a:prstGeom prst="rect">
+            <a:avLst/>
+          </a:prstGeom>
+          <a:noFill/>
+        </p:spPr>
+        <p:txBody>
+          <a:bodyPr wrap="square">
+            <a:spAutoFit/>
+          </a:bodyPr>
+          <a:lstStyle/>
+          <a:p>
+            <a:r>
+              <a:rPr sz="1100">
+                <a:solidFill>
+                  <a:srgbClr val="CADCFC"/>
+                </a:solidFill>
+                <a:latin typeface="Calibri"/>
+              </a:rPr>
+              <a:t>v2 runs a separate DBCV parameter sweep for each embedding set. The optimal HDBSCAN config differs between base and fine-tuned because the density structure changes after training.</a:t>
+            </a:r>
+          </a:p>
+        </p:txBody>
+      </p:sp>
+      <p:sp>
+        <p:nvSpPr>
+          <p:cNvPr id="13" name="Rounded Rectangle 12"/>
+          <p:cNvSpPr/>
+          <p:nvPr/>
+        </p:nvSpPr>
+        <p:spPr>
+          <a:xfrm>
+            <a:off x="274320" y="3200400"/>
+            <a:ext cx="8595360" cy="1280160"/>
+          </a:xfrm>
+          <a:prstGeom prst="roundRect">
+            <a:avLst/>
+          </a:prstGeom>
+          <a:solidFill>
+            <a:srgbClr val="1E293B"/>
+          </a:solidFill>
+          <a:ln>
+            <a:noFill/>
+          </a:ln>
+        </p:spPr>
+        <p:style>
+          <a:lnRef idx="1">
+            <a:schemeClr val="accent1"/>
+          </a:lnRef>
+          <a:fillRef idx="3">
+            <a:schemeClr val="accent1"/>
+          </a:fillRef>
+          <a:effectRef idx="2">
+            <a:schemeClr val="accent1"/>
+          </a:effectRef>
+          <a:fontRef idx="minor">
+            <a:schemeClr val="lt1"/>
+          </a:fontRef>
+        </p:style>
+        <p:txBody>
+          <a:bodyPr rtlCol="0" anchor="ctr"/>
+          <a:lstStyle/>
+          <a:p>
+            <a:pPr algn="ctr"/>
+          </a:p>
+        </p:txBody>
+      </p:sp>
+      <p:sp>
+        <p:nvSpPr>
+          <p:cNvPr id="14" name="TextBox 13"/>
+          <p:cNvSpPr txBox="1"/>
+          <p:nvPr/>
+        </p:nvSpPr>
+        <p:spPr>
+          <a:xfrm>
+            <a:off x="457200" y="3383280"/>
+            <a:ext cx="8229600" cy="457200"/>
+          </a:xfrm>
+          <a:prstGeom prst="rect">
+            <a:avLst/>
+          </a:prstGeom>
+          <a:noFill/>
+        </p:spPr>
+        <p:txBody>
+          <a:bodyPr wrap="square">
+            <a:spAutoFit/>
+          </a:bodyPr>
+          <a:lstStyle/>
+          <a:p>
+            <a:r>
+              <a:rPr sz="1200">
+                <a:solidFill>
+                  <a:srgbClr val="CADCFC"/>
+                </a:solidFill>
+                <a:latin typeface="Calibri"/>
+              </a:rPr>
+              <a:t>Training Configuration:  27K same-intent pairs  |  MultipleNegativesRankingLoss (InfoNCE)  |  3 epochs, batch 64, lr 2e-5  |  Stratified 80/20 split  |  TripletEvaluator on validation set</a:t>
+            </a:r>
+          </a:p>
+        </p:txBody>
+      </p:sp>
+      <p:sp>
+        <p:nvSpPr>
+          <p:cNvPr id="15" name="TextBox 14"/>
+          <p:cNvSpPr txBox="1"/>
+          <p:nvPr/>
+        </p:nvSpPr>
+        <p:spPr>
+          <a:xfrm>
+            <a:off x="457200" y="3840480"/>
+            <a:ext cx="8229600" cy="457200"/>
+          </a:xfrm>
+          <a:prstGeom prst="rect">
+            <a:avLst/>
+          </a:prstGeom>
+          <a:noFill/>
+        </p:spPr>
+        <p:txBody>
+          <a:bodyPr wrap="square">
+            <a:spAutoFit/>
+          </a:bodyPr>
+          <a:lstStyle/>
+          <a:p>
+            <a:r>
+              <a:rPr sz="1000">
+                <a:solidFill>
+                  <a:srgbClr val="94A3B8"/>
+                </a:solidFill>
+                <a:latin typeface="Calibri"/>
+              </a:rPr>
+              <a:t>Category ARI may decrease because fine-tuning optimizes for intent-level separation (27 classes), which can oversplit the coarser 11-category grouping. This is expected and reflects the training objective.</a:t>
+            </a:r>
+          </a:p>
+        </p:txBody>
+      </p:sp>
     </p:spTree>
   </p:cSld>
   <p:clrMapOvr>

</xml_diff>